<commit_message>
Completing merge - adding ICD10 COND tables
</commit_message>
<xml_diff>
--- a/mepstrends/src/custom/img/icon_options/media_icons.pptx
+++ b/mepstrends/src/custom/img/icon_options/media_icons.pptx
@@ -12,34 +12,35 @@
     <p:sldId id="289" r:id="rId6"/>
     <p:sldId id="285" r:id="rId7"/>
     <p:sldId id="290" r:id="rId8"/>
-    <p:sldId id="286" r:id="rId9"/>
-    <p:sldId id="288" r:id="rId10"/>
-    <p:sldId id="264" r:id="rId11"/>
-    <p:sldId id="271" r:id="rId12"/>
-    <p:sldId id="269" r:id="rId13"/>
-    <p:sldId id="268" r:id="rId14"/>
-    <p:sldId id="270" r:id="rId15"/>
-    <p:sldId id="265" r:id="rId16"/>
-    <p:sldId id="272" r:id="rId17"/>
-    <p:sldId id="273" r:id="rId18"/>
-    <p:sldId id="266" r:id="rId19"/>
-    <p:sldId id="274" r:id="rId20"/>
-    <p:sldId id="275" r:id="rId21"/>
-    <p:sldId id="267" r:id="rId22"/>
-    <p:sldId id="276" r:id="rId23"/>
-    <p:sldId id="277" r:id="rId24"/>
-    <p:sldId id="278" r:id="rId25"/>
-    <p:sldId id="279" r:id="rId26"/>
-    <p:sldId id="280" r:id="rId27"/>
-    <p:sldId id="281" r:id="rId28"/>
-    <p:sldId id="256" r:id="rId29"/>
-    <p:sldId id="257" r:id="rId30"/>
-    <p:sldId id="258" r:id="rId31"/>
-    <p:sldId id="259" r:id="rId32"/>
-    <p:sldId id="260" r:id="rId33"/>
-    <p:sldId id="261" r:id="rId34"/>
-    <p:sldId id="262" r:id="rId35"/>
-    <p:sldId id="263" r:id="rId36"/>
+    <p:sldId id="292" r:id="rId9"/>
+    <p:sldId id="286" r:id="rId10"/>
+    <p:sldId id="288" r:id="rId11"/>
+    <p:sldId id="264" r:id="rId12"/>
+    <p:sldId id="271" r:id="rId13"/>
+    <p:sldId id="269" r:id="rId14"/>
+    <p:sldId id="268" r:id="rId15"/>
+    <p:sldId id="270" r:id="rId16"/>
+    <p:sldId id="265" r:id="rId17"/>
+    <p:sldId id="272" r:id="rId18"/>
+    <p:sldId id="273" r:id="rId19"/>
+    <p:sldId id="266" r:id="rId20"/>
+    <p:sldId id="274" r:id="rId21"/>
+    <p:sldId id="275" r:id="rId22"/>
+    <p:sldId id="267" r:id="rId23"/>
+    <p:sldId id="276" r:id="rId24"/>
+    <p:sldId id="277" r:id="rId25"/>
+    <p:sldId id="278" r:id="rId26"/>
+    <p:sldId id="279" r:id="rId27"/>
+    <p:sldId id="280" r:id="rId28"/>
+    <p:sldId id="281" r:id="rId29"/>
+    <p:sldId id="256" r:id="rId30"/>
+    <p:sldId id="257" r:id="rId31"/>
+    <p:sldId id="258" r:id="rId32"/>
+    <p:sldId id="259" r:id="rId33"/>
+    <p:sldId id="260" r:id="rId34"/>
+    <p:sldId id="261" r:id="rId35"/>
+    <p:sldId id="262" r:id="rId36"/>
+    <p:sldId id="263" r:id="rId37"/>
   </p:sldIdLst>
   <p:sldSz cx="9144000" cy="6858000" type="screen4x3"/>
   <p:notesSz cx="6858000" cy="9144000"/>
@@ -338,7 +339,7 @@
           <a:p>
             <a:fld id="{9ADBFD89-6CAF-4951-A415-E43DFF531E73}" type="datetimeFigureOut">
               <a:rPr lang="en-US" smtClean="0"/>
-              <a:t>11/28/2017</a:t>
+              <a:t>5/22/2019</a:t>
             </a:fld>
             <a:endParaRPr lang="en-US"/>
           </a:p>
@@ -508,7 +509,7 @@
           <a:p>
             <a:fld id="{9ADBFD89-6CAF-4951-A415-E43DFF531E73}" type="datetimeFigureOut">
               <a:rPr lang="en-US" smtClean="0"/>
-              <a:t>11/28/2017</a:t>
+              <a:t>5/22/2019</a:t>
             </a:fld>
             <a:endParaRPr lang="en-US"/>
           </a:p>
@@ -688,7 +689,7 @@
           <a:p>
             <a:fld id="{9ADBFD89-6CAF-4951-A415-E43DFF531E73}" type="datetimeFigureOut">
               <a:rPr lang="en-US" smtClean="0"/>
-              <a:t>11/28/2017</a:t>
+              <a:t>5/22/2019</a:t>
             </a:fld>
             <a:endParaRPr lang="en-US"/>
           </a:p>
@@ -858,7 +859,7 @@
           <a:p>
             <a:fld id="{9ADBFD89-6CAF-4951-A415-E43DFF531E73}" type="datetimeFigureOut">
               <a:rPr lang="en-US" smtClean="0"/>
-              <a:t>11/28/2017</a:t>
+              <a:t>5/22/2019</a:t>
             </a:fld>
             <a:endParaRPr lang="en-US"/>
           </a:p>
@@ -1104,7 +1105,7 @@
           <a:p>
             <a:fld id="{9ADBFD89-6CAF-4951-A415-E43DFF531E73}" type="datetimeFigureOut">
               <a:rPr lang="en-US" smtClean="0"/>
-              <a:t>11/28/2017</a:t>
+              <a:t>5/22/2019</a:t>
             </a:fld>
             <a:endParaRPr lang="en-US"/>
           </a:p>
@@ -1392,7 +1393,7 @@
           <a:p>
             <a:fld id="{9ADBFD89-6CAF-4951-A415-E43DFF531E73}" type="datetimeFigureOut">
               <a:rPr lang="en-US" smtClean="0"/>
-              <a:t>11/28/2017</a:t>
+              <a:t>5/22/2019</a:t>
             </a:fld>
             <a:endParaRPr lang="en-US"/>
           </a:p>
@@ -1814,7 +1815,7 @@
           <a:p>
             <a:fld id="{9ADBFD89-6CAF-4951-A415-E43DFF531E73}" type="datetimeFigureOut">
               <a:rPr lang="en-US" smtClean="0"/>
-              <a:t>11/28/2017</a:t>
+              <a:t>5/22/2019</a:t>
             </a:fld>
             <a:endParaRPr lang="en-US"/>
           </a:p>
@@ -1932,7 +1933,7 @@
           <a:p>
             <a:fld id="{9ADBFD89-6CAF-4951-A415-E43DFF531E73}" type="datetimeFigureOut">
               <a:rPr lang="en-US" smtClean="0"/>
-              <a:t>11/28/2017</a:t>
+              <a:t>5/22/2019</a:t>
             </a:fld>
             <a:endParaRPr lang="en-US"/>
           </a:p>
@@ -2027,7 +2028,7 @@
           <a:p>
             <a:fld id="{9ADBFD89-6CAF-4951-A415-E43DFF531E73}" type="datetimeFigureOut">
               <a:rPr lang="en-US" smtClean="0"/>
-              <a:t>11/28/2017</a:t>
+              <a:t>5/22/2019</a:t>
             </a:fld>
             <a:endParaRPr lang="en-US"/>
           </a:p>
@@ -2304,7 +2305,7 @@
           <a:p>
             <a:fld id="{9ADBFD89-6CAF-4951-A415-E43DFF531E73}" type="datetimeFigureOut">
               <a:rPr lang="en-US" smtClean="0"/>
-              <a:t>11/28/2017</a:t>
+              <a:t>5/22/2019</a:t>
             </a:fld>
             <a:endParaRPr lang="en-US"/>
           </a:p>
@@ -2557,7 +2558,7 @@
           <a:p>
             <a:fld id="{9ADBFD89-6CAF-4951-A415-E43DFF531E73}" type="datetimeFigureOut">
               <a:rPr lang="en-US" smtClean="0"/>
-              <a:t>11/28/2017</a:t>
+              <a:t>5/22/2019</a:t>
             </a:fld>
             <a:endParaRPr lang="en-US"/>
           </a:p>
@@ -2770,7 +2771,7 @@
           <a:p>
             <a:fld id="{9ADBFD89-6CAF-4951-A415-E43DFF531E73}" type="datetimeFigureOut">
               <a:rPr lang="en-US" smtClean="0"/>
-              <a:t>11/28/2017</a:t>
+              <a:t>5/22/2019</a:t>
             </a:fld>
             <a:endParaRPr lang="en-US"/>
           </a:p>
@@ -3220,6 +3221,80 @@
       </p:grpSpPr>
       <p:sp>
         <p:nvSpPr>
+          <p:cNvPr id="6" name="Rectangle 5"/>
+          <p:cNvSpPr/>
+          <p:nvPr/>
+        </p:nvSpPr>
+        <p:spPr>
+          <a:xfrm>
+            <a:off x="846715" y="1278320"/>
+            <a:ext cx="7335355" cy="3955715"/>
+          </a:xfrm>
+          <a:prstGeom prst="rect">
+            <a:avLst/>
+          </a:prstGeom>
+        </p:spPr>
+        <p:style>
+          <a:lnRef idx="2">
+            <a:schemeClr val="accent1">
+              <a:shade val="50000"/>
+            </a:schemeClr>
+          </a:lnRef>
+          <a:fillRef idx="1">
+            <a:schemeClr val="accent1"/>
+          </a:fillRef>
+          <a:effectRef idx="0">
+            <a:schemeClr val="accent1"/>
+          </a:effectRef>
+          <a:fontRef idx="minor">
+            <a:schemeClr val="lt1"/>
+          </a:fontRef>
+        </p:style>
+        <p:txBody>
+          <a:bodyPr rtlCol="0" anchor="ctr"/>
+          <a:lstStyle/>
+          <a:p>
+            <a:pPr algn="ctr"/>
+            <a:r>
+              <a:rPr lang="en-US" sz="8800" b="1" dirty="0" smtClean="0"/>
+              <a:t>All options</a:t>
+            </a:r>
+            <a:endParaRPr lang="en-US" sz="8800" b="1" dirty="0"/>
+          </a:p>
+        </p:txBody>
+      </p:sp>
+    </p:spTree>
+    <p:extLst>
+      <p:ext uri="{BB962C8B-B14F-4D97-AF65-F5344CB8AC3E}">
+        <p14:creationId xmlns:p14="http://schemas.microsoft.com/office/powerpoint/2010/main" val="202393104"/>
+      </p:ext>
+    </p:extLst>
+  </p:cSld>
+  <p:clrMapOvr>
+    <a:masterClrMapping/>
+  </p:clrMapOvr>
+</p:sld>
+</file>
+
+<file path=ppt/slides/slide11.xml><?xml version="1.0" encoding="utf-8"?>
+<p:sld xmlns:a="http://schemas.openxmlformats.org/drawingml/2006/main" xmlns:r="http://schemas.openxmlformats.org/officeDocument/2006/relationships" xmlns:p="http://schemas.openxmlformats.org/presentationml/2006/main">
+  <p:cSld>
+    <p:spTree>
+      <p:nvGrpSpPr>
+        <p:cNvPr id="1" name=""/>
+        <p:cNvGrpSpPr/>
+        <p:nvPr/>
+      </p:nvGrpSpPr>
+      <p:grpSpPr>
+        <a:xfrm>
+          <a:off x="0" y="0"/>
+          <a:ext cx="0" cy="0"/>
+          <a:chOff x="0" y="0"/>
+          <a:chExt cx="0" cy="0"/>
+        </a:xfrm>
+      </p:grpSpPr>
+      <p:sp>
+        <p:nvSpPr>
           <p:cNvPr id="4" name="Oval 3"/>
           <p:cNvSpPr/>
           <p:nvPr/>
@@ -3323,7 +3398,7 @@
 </p:sld>
 </file>
 
-<file path=ppt/slides/slide11.xml><?xml version="1.0" encoding="utf-8"?>
+<file path=ppt/slides/slide12.xml><?xml version="1.0" encoding="utf-8"?>
 <p:sld xmlns:a="http://schemas.openxmlformats.org/drawingml/2006/main" xmlns:r="http://schemas.openxmlformats.org/officeDocument/2006/relationships" xmlns:p="http://schemas.openxmlformats.org/presentationml/2006/main">
   <p:cSld>
     <p:spTree>
@@ -3428,103 +3503,6 @@
     <p:extLst>
       <p:ext uri="{BB962C8B-B14F-4D97-AF65-F5344CB8AC3E}">
         <p14:creationId xmlns:p14="http://schemas.microsoft.com/office/powerpoint/2010/main" val="38706084"/>
-      </p:ext>
-    </p:extLst>
-  </p:cSld>
-  <p:clrMapOvr>
-    <a:masterClrMapping/>
-  </p:clrMapOvr>
-</p:sld>
-</file>
-
-<file path=ppt/slides/slide12.xml><?xml version="1.0" encoding="utf-8"?>
-<p:sld xmlns:a="http://schemas.openxmlformats.org/drawingml/2006/main" xmlns:r="http://schemas.openxmlformats.org/officeDocument/2006/relationships" xmlns:p="http://schemas.openxmlformats.org/presentationml/2006/main">
-  <p:cSld>
-    <p:spTree>
-      <p:nvGrpSpPr>
-        <p:cNvPr id="1" name=""/>
-        <p:cNvGrpSpPr/>
-        <p:nvPr/>
-      </p:nvGrpSpPr>
-      <p:grpSpPr>
-        <a:xfrm>
-          <a:off x="0" y="0"/>
-          <a:ext cx="0" cy="0"/>
-          <a:chOff x="0" y="0"/>
-          <a:chExt cx="0" cy="0"/>
-        </a:xfrm>
-      </p:grpSpPr>
-      <p:sp>
-        <p:nvSpPr>
-          <p:cNvPr id="4" name="Oval 3"/>
-          <p:cNvSpPr/>
-          <p:nvPr/>
-        </p:nvSpPr>
-        <p:spPr>
-          <a:xfrm>
-            <a:off x="1538005" y="279790"/>
-            <a:ext cx="6400800" cy="6400800"/>
-          </a:xfrm>
-          <a:prstGeom prst="ellipse">
-            <a:avLst/>
-          </a:prstGeom>
-          <a:solidFill>
-            <a:schemeClr val="bg1"/>
-          </a:solidFill>
-        </p:spPr>
-        <p:style>
-          <a:lnRef idx="2">
-            <a:schemeClr val="accent1">
-              <a:shade val="50000"/>
-            </a:schemeClr>
-          </a:lnRef>
-          <a:fillRef idx="1">
-            <a:schemeClr val="accent1"/>
-          </a:fillRef>
-          <a:effectRef idx="0">
-            <a:schemeClr val="accent1"/>
-          </a:effectRef>
-          <a:fontRef idx="minor">
-            <a:schemeClr val="lt1"/>
-          </a:fontRef>
-        </p:style>
-        <p:txBody>
-          <a:bodyPr rtlCol="0" anchor="ctr"/>
-          <a:lstStyle/>
-          <a:p>
-            <a:pPr algn="ctr"/>
-            <a:endParaRPr lang="en-US"/>
-          </a:p>
-        </p:txBody>
-      </p:sp>
-      <p:pic>
-        <p:nvPicPr>
-          <p:cNvPr id="2" name="Picture 1"/>
-          <p:cNvPicPr>
-            <a:picLocks noChangeAspect="1"/>
-          </p:cNvPicPr>
-          <p:nvPr/>
-        </p:nvPicPr>
-        <p:blipFill>
-          <a:blip r:embed="rId2"/>
-          <a:stretch>
-            <a:fillRect/>
-          </a:stretch>
-        </p:blipFill>
-        <p:spPr>
-          <a:xfrm>
-            <a:off x="1768435" y="587030"/>
-            <a:ext cx="5563804" cy="5607787"/>
-          </a:xfrm>
-          <a:prstGeom prst="rect">
-            <a:avLst/>
-          </a:prstGeom>
-        </p:spPr>
-      </p:pic>
-    </p:spTree>
-    <p:extLst>
-      <p:ext uri="{BB962C8B-B14F-4D97-AF65-F5344CB8AC3E}">
-        <p14:creationId xmlns:p14="http://schemas.microsoft.com/office/powerpoint/2010/main" val="429726216"/>
       </p:ext>
     </p:extLst>
   </p:cSld>
@@ -3594,45 +3572,34 @@
           </a:p>
         </p:txBody>
       </p:sp>
-      <p:sp>
-        <p:nvSpPr>
-          <p:cNvPr id="3" name="TextBox 2"/>
-          <p:cNvSpPr txBox="1"/>
+      <p:pic>
+        <p:nvPicPr>
+          <p:cNvPr id="2" name="Picture 1"/>
+          <p:cNvPicPr>
+            <a:picLocks noChangeAspect="1"/>
+          </p:cNvPicPr>
           <p:nvPr/>
-        </p:nvSpPr>
+        </p:nvPicPr>
+        <p:blipFill>
+          <a:blip r:embed="rId2"/>
+          <a:stretch>
+            <a:fillRect/>
+          </a:stretch>
+        </p:blipFill>
         <p:spPr>
           <a:xfrm>
-            <a:off x="3471040" y="1125699"/>
-            <a:ext cx="2534730" cy="4708981"/>
+            <a:off x="1768435" y="587030"/>
+            <a:ext cx="5563804" cy="5607787"/>
           </a:xfrm>
           <a:prstGeom prst="rect">
             <a:avLst/>
           </a:prstGeom>
-          <a:noFill/>
-        </p:spPr>
-        <p:txBody>
-          <a:bodyPr wrap="square" rtlCol="0">
-            <a:spAutoFit/>
-          </a:bodyPr>
-          <a:lstStyle/>
-          <a:p>
-            <a:pPr algn="ctr"/>
-            <a:r>
-              <a:rPr lang="en-US" sz="30000" dirty="0" smtClean="0">
-                <a:latin typeface="Avenir Next Cyr W04 Demi" panose="020B0703020202020204" pitchFamily="34" charset="0"/>
-              </a:rPr>
-              <a:t>$</a:t>
-            </a:r>
-            <a:endParaRPr lang="en-US" sz="30000" dirty="0">
-              <a:latin typeface="Avenir Next Cyr W04 Demi" panose="020B0703020202020204" pitchFamily="34" charset="0"/>
-            </a:endParaRPr>
-          </a:p>
-        </p:txBody>
-      </p:sp>
+        </p:spPr>
+      </p:pic>
     </p:spTree>
     <p:extLst>
       <p:ext uri="{BB962C8B-B14F-4D97-AF65-F5344CB8AC3E}">
-        <p14:creationId xmlns:p14="http://schemas.microsoft.com/office/powerpoint/2010/main" val="924948455"/>
+        <p14:creationId xmlns:p14="http://schemas.microsoft.com/office/powerpoint/2010/main" val="429726216"/>
       </p:ext>
     </p:extLst>
   </p:cSld>
@@ -3702,6 +3669,114 @@
           </a:p>
         </p:txBody>
       </p:sp>
+      <p:sp>
+        <p:nvSpPr>
+          <p:cNvPr id="3" name="TextBox 2"/>
+          <p:cNvSpPr txBox="1"/>
+          <p:nvPr/>
+        </p:nvSpPr>
+        <p:spPr>
+          <a:xfrm>
+            <a:off x="3471040" y="1125699"/>
+            <a:ext cx="2534730" cy="4708981"/>
+          </a:xfrm>
+          <a:prstGeom prst="rect">
+            <a:avLst/>
+          </a:prstGeom>
+          <a:noFill/>
+        </p:spPr>
+        <p:txBody>
+          <a:bodyPr wrap="square" rtlCol="0">
+            <a:spAutoFit/>
+          </a:bodyPr>
+          <a:lstStyle/>
+          <a:p>
+            <a:pPr algn="ctr"/>
+            <a:r>
+              <a:rPr lang="en-US" sz="30000" dirty="0" smtClean="0">
+                <a:latin typeface="Avenir Next Cyr W04 Demi" panose="020B0703020202020204" pitchFamily="34" charset="0"/>
+              </a:rPr>
+              <a:t>$</a:t>
+            </a:r>
+            <a:endParaRPr lang="en-US" sz="30000" dirty="0">
+              <a:latin typeface="Avenir Next Cyr W04 Demi" panose="020B0703020202020204" pitchFamily="34" charset="0"/>
+            </a:endParaRPr>
+          </a:p>
+        </p:txBody>
+      </p:sp>
+    </p:spTree>
+    <p:extLst>
+      <p:ext uri="{BB962C8B-B14F-4D97-AF65-F5344CB8AC3E}">
+        <p14:creationId xmlns:p14="http://schemas.microsoft.com/office/powerpoint/2010/main" val="924948455"/>
+      </p:ext>
+    </p:extLst>
+  </p:cSld>
+  <p:clrMapOvr>
+    <a:masterClrMapping/>
+  </p:clrMapOvr>
+</p:sld>
+</file>
+
+<file path=ppt/slides/slide15.xml><?xml version="1.0" encoding="utf-8"?>
+<p:sld xmlns:a="http://schemas.openxmlformats.org/drawingml/2006/main" xmlns:r="http://schemas.openxmlformats.org/officeDocument/2006/relationships" xmlns:p="http://schemas.openxmlformats.org/presentationml/2006/main">
+  <p:cSld>
+    <p:spTree>
+      <p:nvGrpSpPr>
+        <p:cNvPr id="1" name=""/>
+        <p:cNvGrpSpPr/>
+        <p:nvPr/>
+      </p:nvGrpSpPr>
+      <p:grpSpPr>
+        <a:xfrm>
+          <a:off x="0" y="0"/>
+          <a:ext cx="0" cy="0"/>
+          <a:chOff x="0" y="0"/>
+          <a:chExt cx="0" cy="0"/>
+        </a:xfrm>
+      </p:grpSpPr>
+      <p:sp>
+        <p:nvSpPr>
+          <p:cNvPr id="4" name="Oval 3"/>
+          <p:cNvSpPr/>
+          <p:nvPr/>
+        </p:nvSpPr>
+        <p:spPr>
+          <a:xfrm>
+            <a:off x="1538005" y="279790"/>
+            <a:ext cx="6400800" cy="6400800"/>
+          </a:xfrm>
+          <a:prstGeom prst="ellipse">
+            <a:avLst/>
+          </a:prstGeom>
+          <a:solidFill>
+            <a:schemeClr val="bg1"/>
+          </a:solidFill>
+        </p:spPr>
+        <p:style>
+          <a:lnRef idx="2">
+            <a:schemeClr val="accent1">
+              <a:shade val="50000"/>
+            </a:schemeClr>
+          </a:lnRef>
+          <a:fillRef idx="1">
+            <a:schemeClr val="accent1"/>
+          </a:fillRef>
+          <a:effectRef idx="0">
+            <a:schemeClr val="accent1"/>
+          </a:effectRef>
+          <a:fontRef idx="minor">
+            <a:schemeClr val="lt1"/>
+          </a:fontRef>
+        </p:style>
+        <p:txBody>
+          <a:bodyPr rtlCol="0" anchor="ctr"/>
+          <a:lstStyle/>
+          <a:p>
+            <a:pPr algn="ctr"/>
+            <a:endParaRPr lang="en-US"/>
+          </a:p>
+        </p:txBody>
+      </p:sp>
       <p:pic>
         <p:nvPicPr>
           <p:cNvPr id="5" name="Picture 4"/>
@@ -3739,7 +3814,7 @@
 </p:sld>
 </file>
 
-<file path=ppt/slides/slide15.xml><?xml version="1.0" encoding="utf-8"?>
+<file path=ppt/slides/slide16.xml><?xml version="1.0" encoding="utf-8"?>
 <p:sld xmlns:a="http://schemas.openxmlformats.org/drawingml/2006/main" xmlns:r="http://schemas.openxmlformats.org/officeDocument/2006/relationships" xmlns:p="http://schemas.openxmlformats.org/presentationml/2006/main">
   <p:cSld>
     <p:spTree>
@@ -3861,7 +3936,7 @@
 </p:sld>
 </file>
 
-<file path=ppt/slides/slide16.xml><?xml version="1.0" encoding="utf-8"?>
+<file path=ppt/slides/slide17.xml><?xml version="1.0" encoding="utf-8"?>
 <p:sld xmlns:a="http://schemas.openxmlformats.org/drawingml/2006/main" xmlns:r="http://schemas.openxmlformats.org/officeDocument/2006/relationships" xmlns:p="http://schemas.openxmlformats.org/presentationml/2006/main">
   <p:cSld>
     <p:spTree>
@@ -3975,7 +4050,7 @@
 </p:sld>
 </file>
 
-<file path=ppt/slides/slide17.xml><?xml version="1.0" encoding="utf-8"?>
+<file path=ppt/slides/slide18.xml><?xml version="1.0" encoding="utf-8"?>
 <p:sld xmlns:a="http://schemas.openxmlformats.org/drawingml/2006/main" xmlns:r="http://schemas.openxmlformats.org/officeDocument/2006/relationships" xmlns:p="http://schemas.openxmlformats.org/presentationml/2006/main">
   <p:cSld>
     <p:spTree>
@@ -4087,7 +4162,7 @@
 </p:sld>
 </file>
 
-<file path=ppt/slides/slide18.xml><?xml version="1.0" encoding="utf-8"?>
+<file path=ppt/slides/slide19.xml><?xml version="1.0" encoding="utf-8"?>
 <p:sld xmlns:a="http://schemas.openxmlformats.org/drawingml/2006/main" xmlns:r="http://schemas.openxmlformats.org/officeDocument/2006/relationships" xmlns:p="http://schemas.openxmlformats.org/presentationml/2006/main">
   <p:cSld>
     <p:spTree>
@@ -4197,118 +4272,6 @@
     <p:extLst>
       <p:ext uri="{BB962C8B-B14F-4D97-AF65-F5344CB8AC3E}">
         <p14:creationId xmlns:p14="http://schemas.microsoft.com/office/powerpoint/2010/main" val="2613846944"/>
-      </p:ext>
-    </p:extLst>
-  </p:cSld>
-  <p:clrMapOvr>
-    <a:masterClrMapping/>
-  </p:clrMapOvr>
-</p:sld>
-</file>
-
-<file path=ppt/slides/slide19.xml><?xml version="1.0" encoding="utf-8"?>
-<p:sld xmlns:a="http://schemas.openxmlformats.org/drawingml/2006/main" xmlns:r="http://schemas.openxmlformats.org/officeDocument/2006/relationships" xmlns:p="http://schemas.openxmlformats.org/presentationml/2006/main">
-  <p:cSld>
-    <p:spTree>
-      <p:nvGrpSpPr>
-        <p:cNvPr id="1" name=""/>
-        <p:cNvGrpSpPr/>
-        <p:nvPr/>
-      </p:nvGrpSpPr>
-      <p:grpSpPr>
-        <a:xfrm>
-          <a:off x="0" y="0"/>
-          <a:ext cx="0" cy="0"/>
-          <a:chOff x="0" y="0"/>
-          <a:chExt cx="0" cy="0"/>
-        </a:xfrm>
-      </p:grpSpPr>
-      <p:sp>
-        <p:nvSpPr>
-          <p:cNvPr id="5" name="Oval 4"/>
-          <p:cNvSpPr/>
-          <p:nvPr/>
-        </p:nvSpPr>
-        <p:spPr>
-          <a:xfrm>
-            <a:off x="1538005" y="279790"/>
-            <a:ext cx="6400800" cy="6400800"/>
-          </a:xfrm>
-          <a:prstGeom prst="ellipse">
-            <a:avLst/>
-          </a:prstGeom>
-          <a:solidFill>
-            <a:schemeClr val="bg1"/>
-          </a:solidFill>
-        </p:spPr>
-        <p:style>
-          <a:lnRef idx="2">
-            <a:schemeClr val="accent1">
-              <a:shade val="50000"/>
-            </a:schemeClr>
-          </a:lnRef>
-          <a:fillRef idx="1">
-            <a:schemeClr val="accent1"/>
-          </a:fillRef>
-          <a:effectRef idx="0">
-            <a:schemeClr val="accent1"/>
-          </a:effectRef>
-          <a:fontRef idx="minor">
-            <a:schemeClr val="lt1"/>
-          </a:fontRef>
-        </p:style>
-        <p:txBody>
-          <a:bodyPr rtlCol="0" anchor="ctr"/>
-          <a:lstStyle/>
-          <a:p>
-            <a:pPr algn="ctr"/>
-            <a:endParaRPr lang="en-US"/>
-          </a:p>
-        </p:txBody>
-      </p:sp>
-      <p:pic>
-        <p:nvPicPr>
-          <p:cNvPr id="6148" name="Picture 4" descr="Red heart with ekg on white - medical design. : Vector Art"/>
-          <p:cNvPicPr>
-            <a:picLocks noChangeAspect="1" noChangeArrowheads="1"/>
-          </p:cNvPicPr>
-          <p:nvPr/>
-        </p:nvPicPr>
-        <p:blipFill rotWithShape="1">
-          <a:blip r:embed="rId2">
-            <a:extLst>
-              <a:ext uri="{28A0092B-C50C-407E-A947-70E740481C1C}">
-                <a14:useLocalDpi xmlns:a14="http://schemas.microsoft.com/office/drawing/2010/main" val="0"/>
-              </a:ext>
-            </a:extLst>
-          </a:blip>
-          <a:srcRect t="57431" b="11310"/>
-          <a:stretch/>
-        </p:blipFill>
-        <p:spPr bwMode="auto">
-          <a:xfrm>
-            <a:off x="1998866" y="2622495"/>
-            <a:ext cx="5405900" cy="1689820"/>
-          </a:xfrm>
-          <a:prstGeom prst="rect">
-            <a:avLst/>
-          </a:prstGeom>
-          <a:noFill/>
-          <a:extLst>
-            <a:ext uri="{909E8E84-426E-40DD-AFC4-6F175D3DCCD1}">
-              <a14:hiddenFill xmlns:a14="http://schemas.microsoft.com/office/drawing/2010/main">
-                <a:solidFill>
-                  <a:srgbClr val="FFFFFF"/>
-                </a:solidFill>
-              </a14:hiddenFill>
-            </a:ext>
-          </a:extLst>
-        </p:spPr>
-      </p:pic>
-    </p:spTree>
-    <p:extLst>
-      <p:ext uri="{BB962C8B-B14F-4D97-AF65-F5344CB8AC3E}">
-        <p14:creationId xmlns:p14="http://schemas.microsoft.com/office/powerpoint/2010/main" val="3763913315"/>
       </p:ext>
     </p:extLst>
   </p:cSld>
@@ -4499,6 +4462,118 @@
       </p:sp>
       <p:pic>
         <p:nvPicPr>
+          <p:cNvPr id="6148" name="Picture 4" descr="Red heart with ekg on white - medical design. : Vector Art"/>
+          <p:cNvPicPr>
+            <a:picLocks noChangeAspect="1" noChangeArrowheads="1"/>
+          </p:cNvPicPr>
+          <p:nvPr/>
+        </p:nvPicPr>
+        <p:blipFill rotWithShape="1">
+          <a:blip r:embed="rId2">
+            <a:extLst>
+              <a:ext uri="{28A0092B-C50C-407E-A947-70E740481C1C}">
+                <a14:useLocalDpi xmlns:a14="http://schemas.microsoft.com/office/drawing/2010/main" val="0"/>
+              </a:ext>
+            </a:extLst>
+          </a:blip>
+          <a:srcRect t="57431" b="11310"/>
+          <a:stretch/>
+        </p:blipFill>
+        <p:spPr bwMode="auto">
+          <a:xfrm>
+            <a:off x="1998866" y="2622495"/>
+            <a:ext cx="5405900" cy="1689820"/>
+          </a:xfrm>
+          <a:prstGeom prst="rect">
+            <a:avLst/>
+          </a:prstGeom>
+          <a:noFill/>
+          <a:extLst>
+            <a:ext uri="{909E8E84-426E-40DD-AFC4-6F175D3DCCD1}">
+              <a14:hiddenFill xmlns:a14="http://schemas.microsoft.com/office/drawing/2010/main">
+                <a:solidFill>
+                  <a:srgbClr val="FFFFFF"/>
+                </a:solidFill>
+              </a14:hiddenFill>
+            </a:ext>
+          </a:extLst>
+        </p:spPr>
+      </p:pic>
+    </p:spTree>
+    <p:extLst>
+      <p:ext uri="{BB962C8B-B14F-4D97-AF65-F5344CB8AC3E}">
+        <p14:creationId xmlns:p14="http://schemas.microsoft.com/office/powerpoint/2010/main" val="3763913315"/>
+      </p:ext>
+    </p:extLst>
+  </p:cSld>
+  <p:clrMapOvr>
+    <a:masterClrMapping/>
+  </p:clrMapOvr>
+</p:sld>
+</file>
+
+<file path=ppt/slides/slide21.xml><?xml version="1.0" encoding="utf-8"?>
+<p:sld xmlns:a="http://schemas.openxmlformats.org/drawingml/2006/main" xmlns:r="http://schemas.openxmlformats.org/officeDocument/2006/relationships" xmlns:p="http://schemas.openxmlformats.org/presentationml/2006/main">
+  <p:cSld>
+    <p:spTree>
+      <p:nvGrpSpPr>
+        <p:cNvPr id="1" name=""/>
+        <p:cNvGrpSpPr/>
+        <p:nvPr/>
+      </p:nvGrpSpPr>
+      <p:grpSpPr>
+        <a:xfrm>
+          <a:off x="0" y="0"/>
+          <a:ext cx="0" cy="0"/>
+          <a:chOff x="0" y="0"/>
+          <a:chExt cx="0" cy="0"/>
+        </a:xfrm>
+      </p:grpSpPr>
+      <p:sp>
+        <p:nvSpPr>
+          <p:cNvPr id="5" name="Oval 4"/>
+          <p:cNvSpPr/>
+          <p:nvPr/>
+        </p:nvSpPr>
+        <p:spPr>
+          <a:xfrm>
+            <a:off x="1538005" y="279790"/>
+            <a:ext cx="6400800" cy="6400800"/>
+          </a:xfrm>
+          <a:prstGeom prst="ellipse">
+            <a:avLst/>
+          </a:prstGeom>
+          <a:solidFill>
+            <a:schemeClr val="bg1"/>
+          </a:solidFill>
+        </p:spPr>
+        <p:style>
+          <a:lnRef idx="2">
+            <a:schemeClr val="accent1">
+              <a:shade val="50000"/>
+            </a:schemeClr>
+          </a:lnRef>
+          <a:fillRef idx="1">
+            <a:schemeClr val="accent1"/>
+          </a:fillRef>
+          <a:effectRef idx="0">
+            <a:schemeClr val="accent1"/>
+          </a:effectRef>
+          <a:fontRef idx="minor">
+            <a:schemeClr val="lt1"/>
+          </a:fontRef>
+        </p:style>
+        <p:txBody>
+          <a:bodyPr rtlCol="0" anchor="ctr"/>
+          <a:lstStyle/>
+          <a:p>
+            <a:pPr algn="ctr"/>
+            <a:endParaRPr lang="en-US"/>
+          </a:p>
+        </p:txBody>
+      </p:sp>
+      <p:pic>
+        <p:nvPicPr>
           <p:cNvPr id="7170" name="Picture 2" descr="The internals icons. Lung and respiratory system vector outline symbols. : Vector Art"/>
           <p:cNvPicPr>
             <a:picLocks noChangeAspect="1" noChangeArrowheads="1"/>
@@ -4549,7 +4624,7 @@
 </p:sld>
 </file>
 
-<file path=ppt/slides/slide21.xml><?xml version="1.0" encoding="utf-8"?>
+<file path=ppt/slides/slide22.xml><?xml version="1.0" encoding="utf-8"?>
 <p:sld xmlns:a="http://schemas.openxmlformats.org/drawingml/2006/main" xmlns:r="http://schemas.openxmlformats.org/officeDocument/2006/relationships" xmlns:p="http://schemas.openxmlformats.org/presentationml/2006/main">
   <p:cSld>
     <p:spTree>
@@ -4671,7 +4746,7 @@
 </p:sld>
 </file>
 
-<file path=ppt/slides/slide22.xml><?xml version="1.0" encoding="utf-8"?>
+<file path=ppt/slides/slide23.xml><?xml version="1.0" encoding="utf-8"?>
 <p:sld xmlns:a="http://schemas.openxmlformats.org/drawingml/2006/main" xmlns:r="http://schemas.openxmlformats.org/officeDocument/2006/relationships" xmlns:p="http://schemas.openxmlformats.org/presentationml/2006/main">
   <p:cSld>
     <p:spTree>
@@ -4776,118 +4851,6 @@
     <p:extLst>
       <p:ext uri="{BB962C8B-B14F-4D97-AF65-F5344CB8AC3E}">
         <p14:creationId xmlns:p14="http://schemas.microsoft.com/office/powerpoint/2010/main" val="1699512642"/>
-      </p:ext>
-    </p:extLst>
-  </p:cSld>
-  <p:clrMapOvr>
-    <a:masterClrMapping/>
-  </p:clrMapOvr>
-</p:sld>
-</file>
-
-<file path=ppt/slides/slide23.xml><?xml version="1.0" encoding="utf-8"?>
-<p:sld xmlns:a="http://schemas.openxmlformats.org/drawingml/2006/main" xmlns:r="http://schemas.openxmlformats.org/officeDocument/2006/relationships" xmlns:p="http://schemas.openxmlformats.org/presentationml/2006/main">
-  <p:cSld>
-    <p:spTree>
-      <p:nvGrpSpPr>
-        <p:cNvPr id="1" name=""/>
-        <p:cNvGrpSpPr/>
-        <p:nvPr/>
-      </p:nvGrpSpPr>
-      <p:grpSpPr>
-        <a:xfrm>
-          <a:off x="0" y="0"/>
-          <a:ext cx="0" cy="0"/>
-          <a:chOff x="0" y="0"/>
-          <a:chExt cx="0" cy="0"/>
-        </a:xfrm>
-      </p:grpSpPr>
-      <p:sp>
-        <p:nvSpPr>
-          <p:cNvPr id="5" name="Oval 4"/>
-          <p:cNvSpPr/>
-          <p:nvPr/>
-        </p:nvSpPr>
-        <p:spPr>
-          <a:xfrm>
-            <a:off x="1538005" y="279790"/>
-            <a:ext cx="6400800" cy="6400800"/>
-          </a:xfrm>
-          <a:prstGeom prst="ellipse">
-            <a:avLst/>
-          </a:prstGeom>
-          <a:solidFill>
-            <a:schemeClr val="bg1"/>
-          </a:solidFill>
-        </p:spPr>
-        <p:style>
-          <a:lnRef idx="2">
-            <a:schemeClr val="accent1">
-              <a:shade val="50000"/>
-            </a:schemeClr>
-          </a:lnRef>
-          <a:fillRef idx="1">
-            <a:schemeClr val="accent1"/>
-          </a:fillRef>
-          <a:effectRef idx="0">
-            <a:schemeClr val="accent1"/>
-          </a:effectRef>
-          <a:fontRef idx="minor">
-            <a:schemeClr val="lt1"/>
-          </a:fontRef>
-        </p:style>
-        <p:txBody>
-          <a:bodyPr rtlCol="0" anchor="ctr"/>
-          <a:lstStyle/>
-          <a:p>
-            <a:pPr algn="ctr"/>
-            <a:endParaRPr lang="en-US"/>
-          </a:p>
-        </p:txBody>
-      </p:sp>
-      <p:pic>
-        <p:nvPicPr>
-          <p:cNvPr id="9218" name="Picture 2" descr="Medical pills and bottles icons set : Vector Art"/>
-          <p:cNvPicPr>
-            <a:picLocks noChangeAspect="1" noChangeArrowheads="1"/>
-          </p:cNvPicPr>
-          <p:nvPr/>
-        </p:nvPicPr>
-        <p:blipFill rotWithShape="1">
-          <a:blip r:embed="rId2">
-            <a:extLst>
-              <a:ext uri="{28A0092B-C50C-407E-A947-70E740481C1C}">
-                <a14:useLocalDpi xmlns:a14="http://schemas.microsoft.com/office/drawing/2010/main" val="0"/>
-              </a:ext>
-            </a:extLst>
-          </a:blip>
-          <a:srcRect l="36676" t="64940" r="37154" b="5014"/>
-          <a:stretch/>
-        </p:blipFill>
-        <p:spPr bwMode="auto">
-          <a:xfrm>
-            <a:off x="3283351" y="1931205"/>
-            <a:ext cx="2910108" cy="3341235"/>
-          </a:xfrm>
-          <a:prstGeom prst="rect">
-            <a:avLst/>
-          </a:prstGeom>
-          <a:noFill/>
-          <a:extLst>
-            <a:ext uri="{909E8E84-426E-40DD-AFC4-6F175D3DCCD1}">
-              <a14:hiddenFill xmlns:a14="http://schemas.microsoft.com/office/drawing/2010/main">
-                <a:solidFill>
-                  <a:srgbClr val="FFFFFF"/>
-                </a:solidFill>
-              </a14:hiddenFill>
-            </a:ext>
-          </a:extLst>
-        </p:spPr>
-      </p:pic>
-    </p:spTree>
-    <p:extLst>
-      <p:ext uri="{BB962C8B-B14F-4D97-AF65-F5344CB8AC3E}">
-        <p14:creationId xmlns:p14="http://schemas.microsoft.com/office/powerpoint/2010/main" val="3030099183"/>
       </p:ext>
     </p:extLst>
   </p:cSld>
@@ -4959,7 +4922,7 @@
       </p:sp>
       <p:pic>
         <p:nvPicPr>
-          <p:cNvPr id="10246" name="Picture 6" descr="Medical or Healthcare Caduceus : Vector Art"/>
+          <p:cNvPr id="9218" name="Picture 2" descr="Medical pills and bottles icons set : Vector Art"/>
           <p:cNvPicPr>
             <a:picLocks noChangeAspect="1" noChangeArrowheads="1"/>
           </p:cNvPicPr>
@@ -4973,13 +4936,13 @@
               </a:ext>
             </a:extLst>
           </a:blip>
-          <a:srcRect b="34942"/>
+          <a:srcRect l="36676" t="64940" r="37154" b="5014"/>
           <a:stretch/>
         </p:blipFill>
         <p:spPr bwMode="auto">
           <a:xfrm>
-            <a:off x="2741345" y="1573093"/>
-            <a:ext cx="3994120" cy="3814194"/>
+            <a:off x="3283351" y="1931205"/>
+            <a:ext cx="2910108" cy="3341235"/>
           </a:xfrm>
           <a:prstGeom prst="rect">
             <a:avLst/>
@@ -4999,7 +4962,7 @@
     </p:spTree>
     <p:extLst>
       <p:ext uri="{BB962C8B-B14F-4D97-AF65-F5344CB8AC3E}">
-        <p14:creationId xmlns:p14="http://schemas.microsoft.com/office/powerpoint/2010/main" val="1860608014"/>
+        <p14:creationId xmlns:p14="http://schemas.microsoft.com/office/powerpoint/2010/main" val="3030099183"/>
       </p:ext>
     </p:extLst>
   </p:cSld>
@@ -5071,7 +5034,7 @@
       </p:sp>
       <p:pic>
         <p:nvPicPr>
-          <p:cNvPr id="11266" name="Picture 2" descr="Caduceus icon. Thin line vector sign. : Vector Art"/>
+          <p:cNvPr id="10246" name="Picture 6" descr="Medical or Healthcare Caduceus : Vector Art"/>
           <p:cNvPicPr>
             <a:picLocks noChangeAspect="1" noChangeArrowheads="1"/>
           </p:cNvPicPr>
@@ -5085,13 +5048,13 @@
               </a:ext>
             </a:extLst>
           </a:blip>
-          <a:srcRect l="24790" t="22914" r="25810" b="27061"/>
+          <a:srcRect b="34942"/>
           <a:stretch/>
         </p:blipFill>
         <p:spPr bwMode="auto">
           <a:xfrm>
-            <a:off x="2920585" y="1739180"/>
-            <a:ext cx="3678719" cy="3725285"/>
+            <a:off x="2741345" y="1573093"/>
+            <a:ext cx="3994120" cy="3814194"/>
           </a:xfrm>
           <a:prstGeom prst="rect">
             <a:avLst/>
@@ -5111,7 +5074,7 @@
     </p:spTree>
     <p:extLst>
       <p:ext uri="{BB962C8B-B14F-4D97-AF65-F5344CB8AC3E}">
-        <p14:creationId xmlns:p14="http://schemas.microsoft.com/office/powerpoint/2010/main" val="3031751185"/>
+        <p14:creationId xmlns:p14="http://schemas.microsoft.com/office/powerpoint/2010/main" val="1860608014"/>
       </p:ext>
     </p:extLst>
   </p:cSld>
@@ -5183,13 +5146,13 @@
       </p:sp>
       <p:pic>
         <p:nvPicPr>
-          <p:cNvPr id="12290" name="Picture 2" descr="Star of Life Icon. Flat Design. : Vector Art"/>
+          <p:cNvPr id="11266" name="Picture 2" descr="Caduceus icon. Thin line vector sign. : Vector Art"/>
           <p:cNvPicPr>
             <a:picLocks noChangeAspect="1" noChangeArrowheads="1"/>
           </p:cNvPicPr>
           <p:nvPr/>
         </p:nvPicPr>
-        <p:blipFill>
+        <p:blipFill rotWithShape="1">
           <a:blip r:embed="rId2">
             <a:extLst>
               <a:ext uri="{28A0092B-C50C-407E-A947-70E740481C1C}">
@@ -5197,15 +5160,13 @@
               </a:ext>
             </a:extLst>
           </a:blip>
-          <a:srcRect/>
-          <a:stretch>
-            <a:fillRect/>
-          </a:stretch>
+          <a:srcRect l="24790" t="22914" r="25810" b="27061"/>
+          <a:stretch/>
         </p:blipFill>
         <p:spPr bwMode="auto">
           <a:xfrm>
-            <a:off x="1896435" y="817460"/>
-            <a:ext cx="5683940" cy="5683941"/>
+            <a:off x="2920585" y="1739180"/>
+            <a:ext cx="3678719" cy="3725285"/>
           </a:xfrm>
           <a:prstGeom prst="rect">
             <a:avLst/>
@@ -5225,7 +5186,7 @@
     </p:spTree>
     <p:extLst>
       <p:ext uri="{BB962C8B-B14F-4D97-AF65-F5344CB8AC3E}">
-        <p14:creationId xmlns:p14="http://schemas.microsoft.com/office/powerpoint/2010/main" val="2603075646"/>
+        <p14:creationId xmlns:p14="http://schemas.microsoft.com/office/powerpoint/2010/main" val="3031751185"/>
       </p:ext>
     </p:extLst>
   </p:cSld>
@@ -5297,6 +5258,120 @@
       </p:sp>
       <p:pic>
         <p:nvPicPr>
+          <p:cNvPr id="12290" name="Picture 2" descr="Star of Life Icon. Flat Design. : Vector Art"/>
+          <p:cNvPicPr>
+            <a:picLocks noChangeAspect="1" noChangeArrowheads="1"/>
+          </p:cNvPicPr>
+          <p:nvPr/>
+        </p:nvPicPr>
+        <p:blipFill>
+          <a:blip r:embed="rId2">
+            <a:extLst>
+              <a:ext uri="{28A0092B-C50C-407E-A947-70E740481C1C}">
+                <a14:useLocalDpi xmlns:a14="http://schemas.microsoft.com/office/drawing/2010/main" val="0"/>
+              </a:ext>
+            </a:extLst>
+          </a:blip>
+          <a:srcRect/>
+          <a:stretch>
+            <a:fillRect/>
+          </a:stretch>
+        </p:blipFill>
+        <p:spPr bwMode="auto">
+          <a:xfrm>
+            <a:off x="1896435" y="817460"/>
+            <a:ext cx="5683940" cy="5683941"/>
+          </a:xfrm>
+          <a:prstGeom prst="rect">
+            <a:avLst/>
+          </a:prstGeom>
+          <a:noFill/>
+          <a:extLst>
+            <a:ext uri="{909E8E84-426E-40DD-AFC4-6F175D3DCCD1}">
+              <a14:hiddenFill xmlns:a14="http://schemas.microsoft.com/office/drawing/2010/main">
+                <a:solidFill>
+                  <a:srgbClr val="FFFFFF"/>
+                </a:solidFill>
+              </a14:hiddenFill>
+            </a:ext>
+          </a:extLst>
+        </p:spPr>
+      </p:pic>
+    </p:spTree>
+    <p:extLst>
+      <p:ext uri="{BB962C8B-B14F-4D97-AF65-F5344CB8AC3E}">
+        <p14:creationId xmlns:p14="http://schemas.microsoft.com/office/powerpoint/2010/main" val="2603075646"/>
+      </p:ext>
+    </p:extLst>
+  </p:cSld>
+  <p:clrMapOvr>
+    <a:masterClrMapping/>
+  </p:clrMapOvr>
+</p:sld>
+</file>
+
+<file path=ppt/slides/slide28.xml><?xml version="1.0" encoding="utf-8"?>
+<p:sld xmlns:a="http://schemas.openxmlformats.org/drawingml/2006/main" xmlns:r="http://schemas.openxmlformats.org/officeDocument/2006/relationships" xmlns:p="http://schemas.openxmlformats.org/presentationml/2006/main">
+  <p:cSld>
+    <p:spTree>
+      <p:nvGrpSpPr>
+        <p:cNvPr id="1" name=""/>
+        <p:cNvGrpSpPr/>
+        <p:nvPr/>
+      </p:nvGrpSpPr>
+      <p:grpSpPr>
+        <a:xfrm>
+          <a:off x="0" y="0"/>
+          <a:ext cx="0" cy="0"/>
+          <a:chOff x="0" y="0"/>
+          <a:chExt cx="0" cy="0"/>
+        </a:xfrm>
+      </p:grpSpPr>
+      <p:sp>
+        <p:nvSpPr>
+          <p:cNvPr id="5" name="Oval 4"/>
+          <p:cNvSpPr/>
+          <p:nvPr/>
+        </p:nvSpPr>
+        <p:spPr>
+          <a:xfrm>
+            <a:off x="1538005" y="279790"/>
+            <a:ext cx="6400800" cy="6400800"/>
+          </a:xfrm>
+          <a:prstGeom prst="ellipse">
+            <a:avLst/>
+          </a:prstGeom>
+          <a:solidFill>
+            <a:schemeClr val="bg1"/>
+          </a:solidFill>
+        </p:spPr>
+        <p:style>
+          <a:lnRef idx="2">
+            <a:schemeClr val="accent1">
+              <a:shade val="50000"/>
+            </a:schemeClr>
+          </a:lnRef>
+          <a:fillRef idx="1">
+            <a:schemeClr val="accent1"/>
+          </a:fillRef>
+          <a:effectRef idx="0">
+            <a:schemeClr val="accent1"/>
+          </a:effectRef>
+          <a:fontRef idx="minor">
+            <a:schemeClr val="lt1"/>
+          </a:fontRef>
+        </p:style>
+        <p:txBody>
+          <a:bodyPr rtlCol="0" anchor="ctr"/>
+          <a:lstStyle/>
+          <a:p>
+            <a:pPr algn="ctr"/>
+            <a:endParaRPr lang="en-US"/>
+          </a:p>
+        </p:txBody>
+      </p:sp>
+      <p:pic>
+        <p:nvPicPr>
           <p:cNvPr id="13314" name="Picture 2" descr="Medical Insurance Icon. Flat Design. : Vector Art"/>
           <p:cNvPicPr>
             <a:picLocks noChangeAspect="1" noChangeArrowheads="1"/>
@@ -5349,7 +5424,7 @@
 </p:sld>
 </file>
 
-<file path=ppt/slides/slide28.xml><?xml version="1.0" encoding="utf-8"?>
+<file path=ppt/slides/slide29.xml><?xml version="1.0" encoding="utf-8"?>
 <p:sld xmlns:a="http://schemas.openxmlformats.org/drawingml/2006/main" xmlns:r="http://schemas.openxmlformats.org/officeDocument/2006/relationships" xmlns:p="http://schemas.openxmlformats.org/presentationml/2006/main">
   <p:cSld>
     <p:spTree>
@@ -5478,125 +5553,6 @@
 </p:sld>
 </file>
 
-<file path=ppt/slides/slide29.xml><?xml version="1.0" encoding="utf-8"?>
-<p:sld xmlns:a="http://schemas.openxmlformats.org/drawingml/2006/main" xmlns:r="http://schemas.openxmlformats.org/officeDocument/2006/relationships" xmlns:p="http://schemas.openxmlformats.org/presentationml/2006/main">
-  <p:cSld>
-    <p:spTree>
-      <p:nvGrpSpPr>
-        <p:cNvPr id="1" name=""/>
-        <p:cNvGrpSpPr/>
-        <p:nvPr/>
-      </p:nvGrpSpPr>
-      <p:grpSpPr>
-        <a:xfrm>
-          <a:off x="0" y="0"/>
-          <a:ext cx="0" cy="0"/>
-          <a:chOff x="0" y="0"/>
-          <a:chExt cx="0" cy="0"/>
-        </a:xfrm>
-      </p:grpSpPr>
-      <p:sp>
-        <p:nvSpPr>
-          <p:cNvPr id="5" name="Oval 4"/>
-          <p:cNvSpPr/>
-          <p:nvPr/>
-        </p:nvSpPr>
-        <p:spPr>
-          <a:xfrm>
-            <a:off x="1538005" y="279790"/>
-            <a:ext cx="6400800" cy="6400800"/>
-          </a:xfrm>
-          <a:prstGeom prst="ellipse">
-            <a:avLst/>
-          </a:prstGeom>
-          <a:solidFill>
-            <a:schemeClr val="bg1"/>
-          </a:solidFill>
-        </p:spPr>
-        <p:style>
-          <a:lnRef idx="2">
-            <a:schemeClr val="accent1">
-              <a:shade val="50000"/>
-            </a:schemeClr>
-          </a:lnRef>
-          <a:fillRef idx="1">
-            <a:schemeClr val="accent1"/>
-          </a:fillRef>
-          <a:effectRef idx="0">
-            <a:schemeClr val="accent1"/>
-          </a:effectRef>
-          <a:fontRef idx="minor">
-            <a:schemeClr val="lt1"/>
-          </a:fontRef>
-        </p:style>
-        <p:txBody>
-          <a:bodyPr rtlCol="0" anchor="ctr"/>
-          <a:lstStyle/>
-          <a:p>
-            <a:pPr algn="ctr"/>
-            <a:endParaRPr lang="en-US"/>
-          </a:p>
-        </p:txBody>
-      </p:sp>
-      <p:pic>
-        <p:nvPicPr>
-          <p:cNvPr id="2050" name="Picture 2" descr="C:\Users\emily.mitchell\Desktop\Programming\GitHub\meps_summary_tables\mepstrends\www\img\oc-ambulance.png"/>
-          <p:cNvPicPr>
-            <a:picLocks noChangeAspect="1" noChangeArrowheads="1"/>
-          </p:cNvPicPr>
-          <p:nvPr/>
-        </p:nvPicPr>
-        <p:blipFill rotWithShape="1">
-          <a:blip r:embed="rId2" cstate="print">
-            <a:duotone>
-              <a:prstClr val="black"/>
-              <a:schemeClr val="tx2">
-                <a:tint val="45000"/>
-                <a:satMod val="400000"/>
-              </a:schemeClr>
-            </a:duotone>
-            <a:extLst>
-              <a:ext uri="{28A0092B-C50C-407E-A947-70E740481C1C}">
-                <a14:useLocalDpi xmlns:a14="http://schemas.microsoft.com/office/drawing/2010/main" val="0"/>
-              </a:ext>
-            </a:extLst>
-          </a:blip>
-          <a:srcRect l="9463" t="28259" r="10391" b="27642"/>
-          <a:stretch/>
-        </p:blipFill>
-        <p:spPr bwMode="auto">
-          <a:xfrm>
-            <a:off x="2110154" y="1931205"/>
-            <a:ext cx="5303520" cy="2918150"/>
-          </a:xfrm>
-          <a:prstGeom prst="rect">
-            <a:avLst/>
-          </a:prstGeom>
-          <a:noFill/>
-          <a:extLst>
-            <a:ext uri="{909E8E84-426E-40DD-AFC4-6F175D3DCCD1}">
-              <a14:hiddenFill xmlns:a14="http://schemas.microsoft.com/office/drawing/2010/main">
-                <a:solidFill>
-                  <a:srgbClr val="FFFFFF"/>
-                </a:solidFill>
-              </a14:hiddenFill>
-            </a:ext>
-          </a:extLst>
-        </p:spPr>
-      </p:pic>
-    </p:spTree>
-    <p:extLst>
-      <p:ext uri="{BB962C8B-B14F-4D97-AF65-F5344CB8AC3E}">
-        <p14:creationId xmlns:p14="http://schemas.microsoft.com/office/powerpoint/2010/main" val="861196733"/>
-      </p:ext>
-    </p:extLst>
-  </p:cSld>
-  <p:clrMapOvr>
-    <a:masterClrMapping/>
-  </p:clrMapOvr>
-</p:sld>
-</file>
-
 <file path=ppt/slides/slide3.xml><?xml version="1.0" encoding="utf-8"?>
 <p:sld xmlns:a="http://schemas.openxmlformats.org/drawingml/2006/main" xmlns:r="http://schemas.openxmlformats.org/officeDocument/2006/relationships" xmlns:p="http://schemas.openxmlformats.org/presentationml/2006/main">
   <p:cSld>
@@ -5792,6 +5748,125 @@
       </p:sp>
       <p:pic>
         <p:nvPicPr>
+          <p:cNvPr id="2050" name="Picture 2" descr="C:\Users\emily.mitchell\Desktop\Programming\GitHub\meps_summary_tables\mepstrends\www\img\oc-ambulance.png"/>
+          <p:cNvPicPr>
+            <a:picLocks noChangeAspect="1" noChangeArrowheads="1"/>
+          </p:cNvPicPr>
+          <p:nvPr/>
+        </p:nvPicPr>
+        <p:blipFill rotWithShape="1">
+          <a:blip r:embed="rId2" cstate="print">
+            <a:duotone>
+              <a:prstClr val="black"/>
+              <a:schemeClr val="tx2">
+                <a:tint val="45000"/>
+                <a:satMod val="400000"/>
+              </a:schemeClr>
+            </a:duotone>
+            <a:extLst>
+              <a:ext uri="{28A0092B-C50C-407E-A947-70E740481C1C}">
+                <a14:useLocalDpi xmlns:a14="http://schemas.microsoft.com/office/drawing/2010/main" val="0"/>
+              </a:ext>
+            </a:extLst>
+          </a:blip>
+          <a:srcRect l="9463" t="28259" r="10391" b="27642"/>
+          <a:stretch/>
+        </p:blipFill>
+        <p:spPr bwMode="auto">
+          <a:xfrm>
+            <a:off x="2110154" y="1931205"/>
+            <a:ext cx="5303520" cy="2918150"/>
+          </a:xfrm>
+          <a:prstGeom prst="rect">
+            <a:avLst/>
+          </a:prstGeom>
+          <a:noFill/>
+          <a:extLst>
+            <a:ext uri="{909E8E84-426E-40DD-AFC4-6F175D3DCCD1}">
+              <a14:hiddenFill xmlns:a14="http://schemas.microsoft.com/office/drawing/2010/main">
+                <a:solidFill>
+                  <a:srgbClr val="FFFFFF"/>
+                </a:solidFill>
+              </a14:hiddenFill>
+            </a:ext>
+          </a:extLst>
+        </p:spPr>
+      </p:pic>
+    </p:spTree>
+    <p:extLst>
+      <p:ext uri="{BB962C8B-B14F-4D97-AF65-F5344CB8AC3E}">
+        <p14:creationId xmlns:p14="http://schemas.microsoft.com/office/powerpoint/2010/main" val="861196733"/>
+      </p:ext>
+    </p:extLst>
+  </p:cSld>
+  <p:clrMapOvr>
+    <a:masterClrMapping/>
+  </p:clrMapOvr>
+</p:sld>
+</file>
+
+<file path=ppt/slides/slide31.xml><?xml version="1.0" encoding="utf-8"?>
+<p:sld xmlns:a="http://schemas.openxmlformats.org/drawingml/2006/main" xmlns:r="http://schemas.openxmlformats.org/officeDocument/2006/relationships" xmlns:p="http://schemas.openxmlformats.org/presentationml/2006/main">
+  <p:cSld>
+    <p:spTree>
+      <p:nvGrpSpPr>
+        <p:cNvPr id="1" name=""/>
+        <p:cNvGrpSpPr/>
+        <p:nvPr/>
+      </p:nvGrpSpPr>
+      <p:grpSpPr>
+        <a:xfrm>
+          <a:off x="0" y="0"/>
+          <a:ext cx="0" cy="0"/>
+          <a:chOff x="0" y="0"/>
+          <a:chExt cx="0" cy="0"/>
+        </a:xfrm>
+      </p:grpSpPr>
+      <p:sp>
+        <p:nvSpPr>
+          <p:cNvPr id="5" name="Oval 4"/>
+          <p:cNvSpPr/>
+          <p:nvPr/>
+        </p:nvSpPr>
+        <p:spPr>
+          <a:xfrm>
+            <a:off x="1538005" y="279790"/>
+            <a:ext cx="6400800" cy="6400800"/>
+          </a:xfrm>
+          <a:prstGeom prst="ellipse">
+            <a:avLst/>
+          </a:prstGeom>
+          <a:solidFill>
+            <a:schemeClr val="bg1"/>
+          </a:solidFill>
+        </p:spPr>
+        <p:style>
+          <a:lnRef idx="2">
+            <a:schemeClr val="accent1">
+              <a:shade val="50000"/>
+            </a:schemeClr>
+          </a:lnRef>
+          <a:fillRef idx="1">
+            <a:schemeClr val="accent1"/>
+          </a:fillRef>
+          <a:effectRef idx="0">
+            <a:schemeClr val="accent1"/>
+          </a:effectRef>
+          <a:fontRef idx="minor">
+            <a:schemeClr val="lt1"/>
+          </a:fontRef>
+        </p:style>
+        <p:txBody>
+          <a:bodyPr rtlCol="0" anchor="ctr"/>
+          <a:lstStyle/>
+          <a:p>
+            <a:pPr algn="ctr"/>
+            <a:endParaRPr lang="en-US"/>
+          </a:p>
+        </p:txBody>
+      </p:sp>
+      <p:pic>
+        <p:nvPicPr>
           <p:cNvPr id="3074" name="Picture 2" descr="C:\Users\emily.mitchell\Desktop\Programming\GitHub\meps_summary_tables\mepstrends\www\img\oc-pulse.png"/>
           <p:cNvPicPr>
             <a:picLocks noChangeAspect="1" noChangeArrowheads="1"/>
@@ -5849,7 +5924,7 @@
 </p:sld>
 </file>
 
-<file path=ppt/slides/slide31.xml><?xml version="1.0" encoding="utf-8"?>
+<file path=ppt/slides/slide32.xml><?xml version="1.0" encoding="utf-8"?>
 <p:sld xmlns:a="http://schemas.openxmlformats.org/drawingml/2006/main" xmlns:r="http://schemas.openxmlformats.org/officeDocument/2006/relationships" xmlns:p="http://schemas.openxmlformats.org/presentationml/2006/main">
   <p:cSld>
     <p:spTree>
@@ -5968,7 +6043,7 @@
 </p:sld>
 </file>
 
-<file path=ppt/slides/slide32.xml><?xml version="1.0" encoding="utf-8"?>
+<file path=ppt/slides/slide33.xml><?xml version="1.0" encoding="utf-8"?>
 <p:sld xmlns:a="http://schemas.openxmlformats.org/drawingml/2006/main" xmlns:r="http://schemas.openxmlformats.org/officeDocument/2006/relationships" xmlns:p="http://schemas.openxmlformats.org/presentationml/2006/main">
   <p:cSld>
     <p:spTree>
@@ -6091,7 +6166,7 @@
 </p:sld>
 </file>
 
-<file path=ppt/slides/slide33.xml><?xml version="1.0" encoding="utf-8"?>
+<file path=ppt/slides/slide34.xml><?xml version="1.0" encoding="utf-8"?>
 <p:sld xmlns:a="http://schemas.openxmlformats.org/drawingml/2006/main" xmlns:r="http://schemas.openxmlformats.org/officeDocument/2006/relationships" xmlns:p="http://schemas.openxmlformats.org/presentationml/2006/main">
   <p:cSld>
     <p:spTree>
@@ -6204,7 +6279,7 @@
 </p:sld>
 </file>
 
-<file path=ppt/slides/slide34.xml><?xml version="1.0" encoding="utf-8"?>
+<file path=ppt/slides/slide35.xml><?xml version="1.0" encoding="utf-8"?>
 <p:sld xmlns:a="http://schemas.openxmlformats.org/drawingml/2006/main" xmlns:r="http://schemas.openxmlformats.org/officeDocument/2006/relationships" xmlns:p="http://schemas.openxmlformats.org/presentationml/2006/main">
   <p:cSld>
     <p:spTree>
@@ -6317,7 +6392,7 @@
 </p:sld>
 </file>
 
-<file path=ppt/slides/slide35.xml><?xml version="1.0" encoding="utf-8"?>
+<file path=ppt/slides/slide36.xml><?xml version="1.0" encoding="utf-8"?>
 <p:sld xmlns:a="http://schemas.openxmlformats.org/drawingml/2006/main" xmlns:r="http://schemas.openxmlformats.org/officeDocument/2006/relationships" xmlns:p="http://schemas.openxmlformats.org/presentationml/2006/main">
   <p:cSld>
     <p:spTree>
@@ -6966,6 +7041,123 @@
     <p:bg>
       <p:bgPr>
         <a:solidFill>
+          <a:schemeClr val="tx2"/>
+        </a:solidFill>
+        <a:effectLst/>
+      </p:bgPr>
+    </p:bg>
+    <p:spTree>
+      <p:nvGrpSpPr>
+        <p:cNvPr id="1" name=""/>
+        <p:cNvGrpSpPr/>
+        <p:nvPr/>
+      </p:nvGrpSpPr>
+      <p:grpSpPr>
+        <a:xfrm>
+          <a:off x="0" y="0"/>
+          <a:ext cx="0" cy="0"/>
+          <a:chOff x="0" y="0"/>
+          <a:chExt cx="0" cy="0"/>
+        </a:xfrm>
+      </p:grpSpPr>
+      <p:sp>
+        <p:nvSpPr>
+          <p:cNvPr id="4" name="Oval 3"/>
+          <p:cNvSpPr/>
+          <p:nvPr/>
+        </p:nvSpPr>
+        <p:spPr>
+          <a:xfrm>
+            <a:off x="1538005" y="279790"/>
+            <a:ext cx="6400800" cy="6400800"/>
+          </a:xfrm>
+          <a:prstGeom prst="ellipse">
+            <a:avLst/>
+          </a:prstGeom>
+          <a:solidFill>
+            <a:schemeClr val="bg1"/>
+          </a:solidFill>
+        </p:spPr>
+        <p:style>
+          <a:lnRef idx="2">
+            <a:schemeClr val="accent1">
+              <a:shade val="50000"/>
+            </a:schemeClr>
+          </a:lnRef>
+          <a:fillRef idx="1">
+            <a:schemeClr val="accent1"/>
+          </a:fillRef>
+          <a:effectRef idx="0">
+            <a:schemeClr val="accent1"/>
+          </a:effectRef>
+          <a:fontRef idx="minor">
+            <a:schemeClr val="lt1"/>
+          </a:fontRef>
+        </p:style>
+        <p:txBody>
+          <a:bodyPr rtlCol="0" anchor="ctr"/>
+          <a:lstStyle/>
+          <a:p>
+            <a:pPr algn="ctr"/>
+            <a:endParaRPr lang="en-US"/>
+          </a:p>
+        </p:txBody>
+      </p:sp>
+      <p:pic>
+        <p:nvPicPr>
+          <p:cNvPr id="2" name="Picture 1"/>
+          <p:cNvPicPr>
+            <a:picLocks noChangeAspect="1"/>
+          </p:cNvPicPr>
+          <p:nvPr/>
+        </p:nvPicPr>
+        <p:blipFill rotWithShape="1">
+          <a:blip r:embed="rId2" cstate="print">
+            <a:duotone>
+              <a:schemeClr val="accent1">
+                <a:shade val="45000"/>
+                <a:satMod val="135000"/>
+              </a:schemeClr>
+              <a:prstClr val="white"/>
+            </a:duotone>
+            <a:extLst>
+              <a:ext uri="{28A0092B-C50C-407E-A947-70E740481C1C}">
+                <a14:useLocalDpi xmlns:a14="http://schemas.microsoft.com/office/drawing/2010/main" val="0"/>
+              </a:ext>
+            </a:extLst>
+          </a:blip>
+          <a:srcRect l="3017" t="15050" r="19935" b="11180"/>
+          <a:stretch/>
+        </p:blipFill>
+        <p:spPr>
+          <a:xfrm>
+            <a:off x="1520448" y="279789"/>
+            <a:ext cx="6418357" cy="6400800"/>
+          </a:xfrm>
+          <a:prstGeom prst="ellipse">
+            <a:avLst/>
+          </a:prstGeom>
+        </p:spPr>
+      </p:pic>
+    </p:spTree>
+    <p:extLst>
+      <p:ext uri="{BB962C8B-B14F-4D97-AF65-F5344CB8AC3E}">
+        <p14:creationId xmlns:p14="http://schemas.microsoft.com/office/powerpoint/2010/main" val="3263899899"/>
+      </p:ext>
+    </p:extLst>
+  </p:cSld>
+  <p:clrMapOvr>
+    <a:masterClrMapping/>
+  </p:clrMapOvr>
+</p:sld>
+</file>
+
+<file path=ppt/slides/slide9.xml><?xml version="1.0" encoding="utf-8"?>
+<p:sld xmlns:a="http://schemas.openxmlformats.org/drawingml/2006/main" xmlns:r="http://schemas.openxmlformats.org/officeDocument/2006/relationships" xmlns:p="http://schemas.openxmlformats.org/presentationml/2006/main">
+  <p:cSld>
+    <p:bg>
+      <p:bgPr>
+        <a:solidFill>
           <a:srgbClr val="015289"/>
         </a:solidFill>
         <a:effectLst/>
@@ -7066,80 +7258,6 @@
     <p:extLst>
       <p:ext uri="{BB962C8B-B14F-4D97-AF65-F5344CB8AC3E}">
         <p14:creationId xmlns:p14="http://schemas.microsoft.com/office/powerpoint/2010/main" val="4195530669"/>
-      </p:ext>
-    </p:extLst>
-  </p:cSld>
-  <p:clrMapOvr>
-    <a:masterClrMapping/>
-  </p:clrMapOvr>
-</p:sld>
-</file>
-
-<file path=ppt/slides/slide9.xml><?xml version="1.0" encoding="utf-8"?>
-<p:sld xmlns:a="http://schemas.openxmlformats.org/drawingml/2006/main" xmlns:r="http://schemas.openxmlformats.org/officeDocument/2006/relationships" xmlns:p="http://schemas.openxmlformats.org/presentationml/2006/main">
-  <p:cSld>
-    <p:spTree>
-      <p:nvGrpSpPr>
-        <p:cNvPr id="1" name=""/>
-        <p:cNvGrpSpPr/>
-        <p:nvPr/>
-      </p:nvGrpSpPr>
-      <p:grpSpPr>
-        <a:xfrm>
-          <a:off x="0" y="0"/>
-          <a:ext cx="0" cy="0"/>
-          <a:chOff x="0" y="0"/>
-          <a:chExt cx="0" cy="0"/>
-        </a:xfrm>
-      </p:grpSpPr>
-      <p:sp>
-        <p:nvSpPr>
-          <p:cNvPr id="6" name="Rectangle 5"/>
-          <p:cNvSpPr/>
-          <p:nvPr/>
-        </p:nvSpPr>
-        <p:spPr>
-          <a:xfrm>
-            <a:off x="846715" y="1278320"/>
-            <a:ext cx="7335355" cy="3955715"/>
-          </a:xfrm>
-          <a:prstGeom prst="rect">
-            <a:avLst/>
-          </a:prstGeom>
-        </p:spPr>
-        <p:style>
-          <a:lnRef idx="2">
-            <a:schemeClr val="accent1">
-              <a:shade val="50000"/>
-            </a:schemeClr>
-          </a:lnRef>
-          <a:fillRef idx="1">
-            <a:schemeClr val="accent1"/>
-          </a:fillRef>
-          <a:effectRef idx="0">
-            <a:schemeClr val="accent1"/>
-          </a:effectRef>
-          <a:fontRef idx="minor">
-            <a:schemeClr val="lt1"/>
-          </a:fontRef>
-        </p:style>
-        <p:txBody>
-          <a:bodyPr rtlCol="0" anchor="ctr"/>
-          <a:lstStyle/>
-          <a:p>
-            <a:pPr algn="ctr"/>
-            <a:r>
-              <a:rPr lang="en-US" sz="8800" b="1" dirty="0" smtClean="0"/>
-              <a:t>All options</a:t>
-            </a:r>
-            <a:endParaRPr lang="en-US" sz="8800" b="1" dirty="0"/>
-          </a:p>
-        </p:txBody>
-      </p:sp>
-    </p:spTree>
-    <p:extLst>
-      <p:ext uri="{BB962C8B-B14F-4D97-AF65-F5344CB8AC3E}">
-        <p14:creationId xmlns:p14="http://schemas.microsoft.com/office/powerpoint/2010/main" val="202393104"/>
       </p:ext>
     </p:extLst>
   </p:cSld>

</xml_diff>